<commit_message>
eCAL v5.5.2: * core   * communication layer reduced to eCAL inproc, eCAL shm, eCAL udp multicast and Iceoryx     * fastrtps layer removed     * lcm layer removed     * udp unicast layer removed     * eCAL metal layer removed * monitoring   * ecal core initialization state shown in monitor   * loaded time plugin name and state shown in monitor * ecal player   * command line handling improved   * gui minor fixes * bugfixes   * eCAL:CTimer bugfix in loop time calculation   * use system_clock instead steady_clock if time plugin handling failed or not configured   * wrong host id calculation based on installed network adapters fixed   * python eCAL service fixed (#39) - thanks @JeremyBYU * improvements   * eCAL:CTimer improved precision   * unit tests added
Co-authored-by: Rex Schilasky <49162693+rex-schilasky@users.noreply.github.com>
Co-authored-by: Kristof Hannemann <50989282+hannemn@users.noreply.github.com>
</commit_message>
<xml_diff>
--- a/doc/eCAL.pptx
+++ b/doc/eCAL.pptx
@@ -322,7 +322,7 @@
             <a:fld id="{9482B374-514F-45E9-82B1-9EFE5957402D}" type="datetime1">
               <a:rPr lang="de-DE" sz="1000" smtClean="0"/>
               <a:pPr/>
-              <a:t>04.12.2019</a:t>
+              <a:t>28.01.2020</a:t>
             </a:fld>
             <a:endParaRPr lang="en-US" sz="1000"/>
           </a:p>
@@ -493,7 +493,7 @@
             <a:fld id="{323F5C47-E162-42FA-98C0-1ACA2E25758A}" type="datetime1">
               <a:rPr lang="de-DE" smtClean="0"/>
               <a:pPr/>
-              <a:t>04.12.2019</a:t>
+              <a:t>28.01.2020</a:t>
             </a:fld>
             <a:endParaRPr lang="en-US"/>
           </a:p>
@@ -841,7 +841,7 @@
             <a:fld id="{323F5C47-E162-42FA-98C0-1ACA2E25758A}" type="datetime1">
               <a:rPr lang="en-US" smtClean="0"/>
               <a:pPr/>
-              <a:t>12/4/2019</a:t>
+              <a:t>1/28/2020</a:t>
             </a:fld>
             <a:endParaRPr lang="en-US"/>
           </a:p>
@@ -979,7 +979,7 @@
             <a:fld id="{323F5C47-E162-42FA-98C0-1ACA2E25758A}" type="datetime1">
               <a:rPr lang="en-US" smtClean="0"/>
               <a:pPr/>
-              <a:t>12/4/2019</a:t>
+              <a:t>1/28/2020</a:t>
             </a:fld>
             <a:endParaRPr lang="en-US"/>
           </a:p>
@@ -1124,7 +1124,7 @@
             <a:fld id="{FA8CA14D-6852-46AA-B36A-4437D0482A78}" type="datetime1">
               <a:rPr lang="en-US" smtClean="0"/>
               <a:pPr/>
-              <a:t>12/4/2019</a:t>
+              <a:t>1/28/2020</a:t>
             </a:fld>
             <a:endParaRPr lang="en-US"/>
           </a:p>
@@ -2286,7 +2286,7 @@
             <a:fld id="{C0CEF923-CC27-4F42-A3CA-3535FDEA38A8}" type="datetime4">
               <a:rPr lang="en-US" noProof="0" smtClean="0"/>
               <a:pPr/>
-              <a:t>December 4, 2019</a:t>
+              <a:t>January 28, 2020</a:t>
             </a:fld>
             <a:endParaRPr lang="en-US" noProof="0"/>
           </a:p>
@@ -2798,7 +2798,7 @@
             <a:fld id="{AE903120-3BAB-48D5-8178-C932D0FCD2E2}" type="datetime4">
               <a:rPr lang="en-US" noProof="0" smtClean="0"/>
               <a:pPr/>
-              <a:t>December 4, 2019</a:t>
+              <a:t>January 28, 2020</a:t>
             </a:fld>
             <a:endParaRPr lang="en-US" noProof="0"/>
           </a:p>
@@ -3133,7 +3133,7 @@
             <a:fld id="{A88E913E-A622-4FF1-B97B-42C8AFF19EFD}" type="datetime4">
               <a:rPr lang="en-US" noProof="0" smtClean="0"/>
               <a:pPr/>
-              <a:t>December 4, 2019</a:t>
+              <a:t>January 28, 2020</a:t>
             </a:fld>
             <a:endParaRPr lang="en-US" noProof="0"/>
           </a:p>
@@ -3762,7 +3762,7 @@
             <a:fld id="{9857078E-6325-488D-A844-6B585767C8A3}" type="datetime4">
               <a:rPr lang="en-US" noProof="0" smtClean="0"/>
               <a:pPr/>
-              <a:t>December 4, 2019</a:t>
+              <a:t>January 28, 2020</a:t>
             </a:fld>
             <a:endParaRPr lang="en-US" noProof="0"/>
           </a:p>
@@ -4271,7 +4271,7 @@
             <a:fld id="{E59B82B3-D0E1-436E-87BF-63B7462754E4}" type="datetime4">
               <a:rPr lang="en-US" noProof="0" smtClean="0"/>
               <a:pPr/>
-              <a:t>December 4, 2019</a:t>
+              <a:t>January 28, 2020</a:t>
             </a:fld>
             <a:endParaRPr lang="en-US" noProof="0"/>
           </a:p>
@@ -4779,7 +4779,7 @@
             <a:fld id="{1778E95C-90A9-47F3-94FC-26BB930BF367}" type="datetime4">
               <a:rPr lang="en-US" noProof="0" smtClean="0"/>
               <a:pPr/>
-              <a:t>December 4, 2019</a:t>
+              <a:t>January 28, 2020</a:t>
             </a:fld>
             <a:endParaRPr lang="en-US" noProof="0"/>
           </a:p>
@@ -4906,7 +4906,7 @@
             <a:fld id="{5C1C0433-6B39-4E2B-8F5B-6B4B244C3ECE}" type="datetime4">
               <a:rPr lang="en-US" noProof="0" smtClean="0"/>
               <a:pPr/>
-              <a:t>December 4, 2019</a:t>
+              <a:t>January 28, 2020</a:t>
             </a:fld>
             <a:endParaRPr lang="en-US" noProof="0"/>
           </a:p>
@@ -5195,7 +5195,7 @@
             <a:fld id="{5B9F1013-C68F-45DE-A2A8-ABB1776BF6C1}" type="datetime4">
               <a:rPr lang="en-US" noProof="0" smtClean="0"/>
               <a:pPr/>
-              <a:t>December 4, 2019</a:t>
+              <a:t>January 28, 2020</a:t>
             </a:fld>
             <a:endParaRPr lang="en-US" noProof="0"/>
           </a:p>
@@ -5855,7 +5855,7 @@
             <a:fld id="{F903D1D1-7F42-43C4-ADD4-518F62B4B1A7}" type="datetime4">
               <a:rPr lang="en-US" noProof="0" smtClean="0"/>
               <a:pPr/>
-              <a:t>December 4, 2019</a:t>
+              <a:t>January 28, 2020</a:t>
             </a:fld>
             <a:endParaRPr lang="en-US" noProof="0"/>
           </a:p>
@@ -6507,7 +6507,7 @@
             <a:fld id="{A391F275-0A79-47DF-8CE0-6E5191350150}" type="datetime4">
               <a:rPr lang="en-US" noProof="0" smtClean="0"/>
               <a:pPr/>
-              <a:t>December 4, 2019</a:t>
+              <a:t>January 28, 2020</a:t>
             </a:fld>
             <a:endParaRPr lang="en-US" noProof="0"/>
           </a:p>
@@ -6991,7 +6991,7 @@
             <a:fld id="{A52FEDD3-893C-49FF-8882-6FC7BC61D6E5}" type="datetime4">
               <a:rPr lang="en-US" noProof="0" smtClean="0"/>
               <a:pPr/>
-              <a:t>December 4, 2019</a:t>
+              <a:t>January 28, 2020</a:t>
             </a:fld>
             <a:endParaRPr lang="en-US" noProof="0"/>
           </a:p>
@@ -7269,7 +7269,7 @@
             <a:fld id="{754CC1F9-E5C4-4DE1-A8E3-E6949A1E558A}" type="datetime4">
               <a:rPr lang="en-US" noProof="0" smtClean="0"/>
               <a:pPr/>
-              <a:t>December 4, 2019</a:t>
+              <a:t>January 28, 2020</a:t>
             </a:fld>
             <a:endParaRPr lang="en-US" noProof="0"/>
           </a:p>
@@ -9427,7 +9427,7 @@
             <a:fld id="{04D55E88-34B4-42E5-9DA2-8E866D3D3D47}" type="datetime4">
               <a:rPr lang="en-US" noProof="0" smtClean="0"/>
               <a:pPr/>
-              <a:t>December 4, 2019</a:t>
+              <a:t>January 28, 2020</a:t>
             </a:fld>
             <a:endParaRPr lang="en-US" noProof="0"/>
           </a:p>
@@ -10113,7 +10113,7 @@
             <a:fld id="{0B39444B-FB5A-407E-88EB-64BE3DC64896}" type="datetime4">
               <a:rPr lang="en-US" noProof="0" smtClean="0"/>
               <a:pPr/>
-              <a:t>December 4, 2019</a:t>
+              <a:t>January 28, 2020</a:t>
             </a:fld>
             <a:endParaRPr lang="en-US" noProof="0"/>
           </a:p>
@@ -10779,7 +10779,7 @@
             <a:fld id="{B71451C9-93A8-4493-A949-834F0A4C621C}" type="datetime4">
               <a:rPr lang="en-US" noProof="0" smtClean="0"/>
               <a:pPr/>
-              <a:t>December 4, 2019</a:t>
+              <a:t>January 28, 2020</a:t>
             </a:fld>
             <a:endParaRPr lang="en-US" noProof="0"/>
           </a:p>
@@ -11071,7 +11071,7 @@
             <a:fld id="{823E2FF0-B26C-4EFC-BF0E-956DFE4C933C}" type="datetime4">
               <a:rPr lang="en-US" noProof="0" smtClean="0"/>
               <a:pPr/>
-              <a:t>December 4, 2019</a:t>
+              <a:t>January 28, 2020</a:t>
             </a:fld>
             <a:endParaRPr lang="en-US" noProof="0"/>
           </a:p>
@@ -11732,7 +11732,7 @@
             <a:fld id="{18724406-19C3-4AAF-923B-8B877F8F9929}" type="datetime4">
               <a:rPr lang="en-US" noProof="0" smtClean="0"/>
               <a:pPr/>
-              <a:t>December 4, 2019</a:t>
+              <a:t>January 28, 2020</a:t>
             </a:fld>
             <a:endParaRPr lang="en-US" noProof="0"/>
           </a:p>
@@ -12035,7 +12035,7 @@
             <a:fld id="{C61B0F03-4438-41D6-A13D-82FE00E669C6}" type="datetime4">
               <a:rPr lang="en-US" noProof="0" smtClean="0"/>
               <a:pPr/>
-              <a:t>December 4, 2019</a:t>
+              <a:t>January 28, 2020</a:t>
             </a:fld>
             <a:endParaRPr lang="en-US" noProof="0"/>
           </a:p>
@@ -12939,7 +12939,7 @@
             <a:fld id="{1778E95C-90A9-47F3-94FC-26BB930BF367}" type="datetime4">
               <a:rPr lang="en-US" noProof="0" smtClean="0"/>
               <a:pPr/>
-              <a:t>December 4, 2019</a:t>
+              <a:t>January 28, 2020</a:t>
             </a:fld>
             <a:endParaRPr lang="en-US" noProof="0"/>
           </a:p>
@@ -13708,7 +13708,7 @@
             <a:fld id="{1778E95C-90A9-47F3-94FC-26BB930BF367}" type="datetime4">
               <a:rPr lang="en-US" noProof="0" smtClean="0"/>
               <a:pPr/>
-              <a:t>December 4, 2019</a:t>
+              <a:t>January 28, 2020</a:t>
             </a:fld>
             <a:endParaRPr lang="en-US" noProof="0" dirty="0"/>
           </a:p>
@@ -13859,19 +13859,7 @@
               <a:rPr lang="en-US" sz="1600" dirty="0">
                 <a:cs typeface="Arial" pitchFamily="34" charset="0"/>
               </a:rPr>
-              <a:t> unicast/multicast, lcm, </a:t>
-            </a:r>
-            <a:r>
-              <a:rPr lang="en-US" sz="1600" dirty="0" err="1">
-                <a:cs typeface="Arial" pitchFamily="34" charset="0"/>
-              </a:rPr>
-              <a:t>rtps</a:t>
-            </a:r>
-            <a:r>
-              <a:rPr lang="en-US" sz="1600" dirty="0">
-                <a:cs typeface="Arial" pitchFamily="34" charset="0"/>
-              </a:rPr>
-              <a:t>)</a:t>
+              <a:t> unicast/multicast)</a:t>
             </a:r>
           </a:p>
           <a:p>
@@ -14668,7 +14656,7 @@
             <a:fld id="{1778E95C-90A9-47F3-94FC-26BB930BF367}" type="datetime4">
               <a:rPr lang="en-US" noProof="0" smtClean="0"/>
               <a:pPr/>
-              <a:t>December 4, 2019</a:t>
+              <a:t>January 28, 2020</a:t>
             </a:fld>
             <a:endParaRPr lang="en-US" noProof="0" dirty="0"/>
           </a:p>
@@ -15956,7 +15944,7 @@
                   </a:schemeClr>
                 </a:solidFill>
               </a:rPr>
-              <a:t> Native / LCM / </a:t>
+              <a:t> </a:t>
             </a:r>
             <a:r>
               <a:rPr lang="de-DE" sz="1400" dirty="0" err="1">
@@ -15966,7 +15954,7 @@
                   </a:schemeClr>
                 </a:solidFill>
               </a:rPr>
-              <a:t>fastRTPS</a:t>
+              <a:t>Shared</a:t>
             </a:r>
             <a:r>
               <a:rPr lang="de-DE" sz="1400" dirty="0">
@@ -15976,7 +15964,7 @@
                   </a:schemeClr>
                 </a:solidFill>
               </a:rPr>
-              <a:t> (</a:t>
+              <a:t> Memory / </a:t>
             </a:r>
             <a:r>
               <a:rPr lang="de-DE" sz="1400" dirty="0" err="1">
@@ -15986,7 +15974,7 @@
                   </a:schemeClr>
                 </a:solidFill>
               </a:rPr>
-              <a:t>eProsima</a:t>
+              <a:t>Iceoryx</a:t>
             </a:r>
             <a:r>
               <a:rPr lang="de-DE" sz="1400" dirty="0">
@@ -15996,7 +15984,7 @@
                   </a:schemeClr>
                 </a:solidFill>
               </a:rPr>
-              <a:t>) / </a:t>
+              <a:t> </a:t>
             </a:r>
             <a:r>
               <a:rPr lang="de-DE" sz="1400" dirty="0" err="1">
@@ -16006,7 +15994,7 @@
                   </a:schemeClr>
                 </a:solidFill>
               </a:rPr>
-              <a:t>Iceoryx</a:t>
+              <a:t>Shared</a:t>
             </a:r>
             <a:r>
               <a:rPr lang="de-DE" sz="1400" dirty="0">
@@ -16016,7 +16004,27 @@
                   </a:schemeClr>
                 </a:solidFill>
               </a:rPr>
-              <a:t> (Bosch)</a:t>
+              <a:t> Memory / </a:t>
+            </a:r>
+            <a:r>
+              <a:rPr lang="de-DE" sz="1400" dirty="0" err="1">
+                <a:solidFill>
+                  <a:schemeClr val="bg1">
+                    <a:lumMod val="95000"/>
+                  </a:schemeClr>
+                </a:solidFill>
+              </a:rPr>
+              <a:t>eCAL</a:t>
+            </a:r>
+            <a:r>
+              <a:rPr lang="de-DE" sz="1400" dirty="0">
+                <a:solidFill>
+                  <a:schemeClr val="bg1">
+                    <a:lumMod val="95000"/>
+                  </a:schemeClr>
+                </a:solidFill>
+              </a:rPr>
+              <a:t> UDP Multicast</a:t>
             </a:r>
           </a:p>
         </p:txBody>
@@ -17788,7 +17796,7 @@
             <a:fld id="{1778E95C-90A9-47F3-94FC-26BB930BF367}" type="datetime4">
               <a:rPr lang="en-US" noProof="0" smtClean="0"/>
               <a:pPr/>
-              <a:t>December 4, 2019</a:t>
+              <a:t>January 28, 2020</a:t>
             </a:fld>
             <a:endParaRPr lang="en-US" noProof="0" dirty="0"/>
           </a:p>
@@ -18013,7 +18021,7 @@
               <a:rPr lang="en-US" sz="1600" dirty="0" err="1">
                 <a:cs typeface="Arial" pitchFamily="34" charset="0"/>
               </a:rPr>
-              <a:t>google:lcm</a:t>
+              <a:t>Iceoryx</a:t>
             </a:r>
             <a:r>
               <a:rPr lang="en-US" sz="1600" dirty="0">
@@ -18023,137 +18031,7 @@
             </a:r>
             <a:r>
               <a:rPr lang="en-US" sz="1600" dirty="0">
-                <a:cs typeface="Arial" pitchFamily="34" charset="0"/>
                 <a:hlinkClick r:id="rId2"/>
-              </a:rPr>
-              <a:t>http://lcm-proj.github.io/</a:t>
-            </a:r>
-            <a:r>
-              <a:rPr lang="en-US" sz="1600" dirty="0">
-                <a:cs typeface="Arial" pitchFamily="34" charset="0"/>
-              </a:rPr>
-              <a:t>)</a:t>
-            </a:r>
-          </a:p>
-          <a:p>
-            <a:pPr marL="635000" lvl="1" indent="-177800">
-              <a:spcAft>
-                <a:spcPts val="1100"/>
-              </a:spcAft>
-              <a:buClr>
-                <a:schemeClr val="accent1"/>
-              </a:buClr>
-              <a:buSzPct val="125000"/>
-              <a:buFont typeface="Arial" pitchFamily="34" charset="0"/>
-              <a:buChar char="›"/>
-              <a:defRPr/>
-            </a:pPr>
-            <a:r>
-              <a:rPr lang="en-US" sz="1600" dirty="0" err="1">
-                <a:cs typeface="Arial" pitchFamily="34" charset="0"/>
-              </a:rPr>
-              <a:t>udp</a:t>
-            </a:r>
-            <a:r>
-              <a:rPr lang="en-US" sz="1600" dirty="0">
-                <a:cs typeface="Arial" pitchFamily="34" charset="0"/>
-              </a:rPr>
-              <a:t> multicast based (single multicast group), none reliable, single threaded, multi process / host</a:t>
-            </a:r>
-          </a:p>
-          <a:p>
-            <a:pPr marL="177800" indent="-177800">
-              <a:spcAft>
-                <a:spcPts val="1100"/>
-              </a:spcAft>
-              <a:buClr>
-                <a:schemeClr val="accent1"/>
-              </a:buClr>
-              <a:buSzPct val="125000"/>
-              <a:buFont typeface="Arial" pitchFamily="34" charset="0"/>
-              <a:buChar char="›"/>
-              <a:defRPr/>
-            </a:pPr>
-            <a:r>
-              <a:rPr lang="en-US" sz="1600" dirty="0" err="1">
-                <a:cs typeface="Arial" pitchFamily="34" charset="0"/>
-              </a:rPr>
-              <a:t>fastRTPS</a:t>
-            </a:r>
-            <a:r>
-              <a:rPr lang="en-US" sz="1600" dirty="0">
-                <a:cs typeface="Arial" pitchFamily="34" charset="0"/>
-              </a:rPr>
-              <a:t> (</a:t>
-            </a:r>
-            <a:r>
-              <a:rPr lang="en-US" sz="1600" dirty="0">
-                <a:cs typeface="Arial" pitchFamily="34" charset="0"/>
-                <a:hlinkClick r:id="rId3"/>
-              </a:rPr>
-              <a:t>http://www.eprosima.com</a:t>
-            </a:r>
-            <a:r>
-              <a:rPr lang="en-US" sz="1600" dirty="0">
-                <a:cs typeface="Arial" pitchFamily="34" charset="0"/>
-              </a:rPr>
-              <a:t>)</a:t>
-            </a:r>
-          </a:p>
-          <a:p>
-            <a:pPr marL="635000" lvl="1" indent="-177800">
-              <a:spcAft>
-                <a:spcPts val="1100"/>
-              </a:spcAft>
-              <a:buClr>
-                <a:schemeClr val="accent1"/>
-              </a:buClr>
-              <a:buSzPct val="125000"/>
-              <a:buFont typeface="Arial" pitchFamily="34" charset="0"/>
-              <a:buChar char="›"/>
-              <a:defRPr/>
-            </a:pPr>
-            <a:r>
-              <a:rPr lang="en-US" sz="1600" dirty="0" err="1">
-                <a:cs typeface="Arial" pitchFamily="34" charset="0"/>
-              </a:rPr>
-              <a:t>dds</a:t>
-            </a:r>
-            <a:r>
-              <a:rPr lang="en-US" sz="1600" dirty="0">
-                <a:cs typeface="Arial" pitchFamily="34" charset="0"/>
-              </a:rPr>
-              <a:t> standard - supports QOS, multi process / host (currently multicast transport only)</a:t>
-            </a:r>
-          </a:p>
-          <a:p>
-            <a:pPr marL="177800" indent="-177800">
-              <a:spcAft>
-                <a:spcPts val="1100"/>
-              </a:spcAft>
-              <a:buClr>
-                <a:schemeClr val="accent1"/>
-              </a:buClr>
-              <a:buSzPct val="125000"/>
-              <a:buFont typeface="Arial" pitchFamily="34" charset="0"/>
-              <a:buChar char="›"/>
-              <a:defRPr/>
-            </a:pPr>
-            <a:r>
-              <a:rPr lang="en-US" sz="1600" dirty="0" err="1">
-                <a:cs typeface="Arial" pitchFamily="34" charset="0"/>
-              </a:rPr>
-              <a:t>Iceoryx</a:t>
-            </a:r>
-            <a:r>
-              <a:rPr lang="en-US" sz="1600" dirty="0">
-                <a:cs typeface="Arial" pitchFamily="34" charset="0"/>
-              </a:rPr>
-              <a:t> (</a:t>
-            </a:r>
-            <a:r>
-              <a:rPr lang="en-US" sz="1600" dirty="0">
-                <a:hlinkClick r:id="rId4"/>
               </a:rPr>
               <a:t>https://github.com/eclipse/iceoryx</a:t>
             </a:r>
@@ -18420,33 +18298,15 @@
                                   </p:childTnLst>
                                 </p:cTn>
                               </p:par>
-                            </p:childTnLst>
-                          </p:cTn>
-                        </p:par>
-                      </p:childTnLst>
-                    </p:cTn>
-                  </p:par>
-                  <p:par>
-                    <p:cTn id="17" fill="hold">
-                      <p:stCondLst>
-                        <p:cond delay="indefinite"/>
-                      </p:stCondLst>
-                      <p:childTnLst>
-                        <p:par>
-                          <p:cTn id="18" fill="hold">
-                            <p:stCondLst>
-                              <p:cond delay="0"/>
-                            </p:stCondLst>
-                            <p:childTnLst>
                               <p:par>
-                                <p:cTn id="19" presetID="1" presetClass="entr" presetSubtype="0" fill="hold" nodeType="clickEffect">
+                                <p:cTn id="17" presetID="1" presetClass="entr" presetSubtype="0" fill="hold" nodeType="withEffect">
                                   <p:stCondLst>
                                     <p:cond delay="0"/>
                                   </p:stCondLst>
                                   <p:childTnLst>
                                     <p:set>
                                       <p:cBhvr>
-                                        <p:cTn id="20" dur="1" fill="hold">
+                                        <p:cTn id="18" dur="1" fill="hold">
                                           <p:stCondLst>
                                             <p:cond delay="0"/>
                                           </p:stCondLst>
@@ -18470,14 +18330,14 @@
                                 </p:cTn>
                               </p:par>
                               <p:par>
-                                <p:cTn id="21" presetID="1" presetClass="entr" presetSubtype="0" fill="hold" nodeType="withEffect">
+                                <p:cTn id="19" presetID="1" presetClass="entr" presetSubtype="0" fill="hold" nodeType="withEffect">
                                   <p:stCondLst>
                                     <p:cond delay="0"/>
                                   </p:stCondLst>
                                   <p:childTnLst>
                                     <p:set>
                                       <p:cBhvr>
-                                        <p:cTn id="22" dur="1" fill="hold">
+                                        <p:cTn id="20" dur="1" fill="hold">
                                           <p:stCondLst>
                                             <p:cond delay="0"/>
                                           </p:stCondLst>
@@ -18486,130 +18346,6 @@
                                           <p:spTgt spid="8">
                                             <p:txEl>
                                               <p:pRg st="7" end="7"/>
-                                            </p:txEl>
-                                          </p:spTgt>
-                                        </p:tgtEl>
-                                        <p:attrNameLst>
-                                          <p:attrName>style.visibility</p:attrName>
-                                        </p:attrNameLst>
-                                      </p:cBhvr>
-                                      <p:to>
-                                        <p:strVal val="visible"/>
-                                      </p:to>
-                                    </p:set>
-                                  </p:childTnLst>
-                                </p:cTn>
-                              </p:par>
-                              <p:par>
-                                <p:cTn id="23" presetID="1" presetClass="entr" presetSubtype="0" fill="hold" nodeType="withEffect">
-                                  <p:stCondLst>
-                                    <p:cond delay="0"/>
-                                  </p:stCondLst>
-                                  <p:childTnLst>
-                                    <p:set>
-                                      <p:cBhvr>
-                                        <p:cTn id="24" dur="1" fill="hold">
-                                          <p:stCondLst>
-                                            <p:cond delay="0"/>
-                                          </p:stCondLst>
-                                        </p:cTn>
-                                        <p:tgtEl>
-                                          <p:spTgt spid="8">
-                                            <p:txEl>
-                                              <p:pRg st="8" end="8"/>
-                                            </p:txEl>
-                                          </p:spTgt>
-                                        </p:tgtEl>
-                                        <p:attrNameLst>
-                                          <p:attrName>style.visibility</p:attrName>
-                                        </p:attrNameLst>
-                                      </p:cBhvr>
-                                      <p:to>
-                                        <p:strVal val="visible"/>
-                                      </p:to>
-                                    </p:set>
-                                  </p:childTnLst>
-                                </p:cTn>
-                              </p:par>
-                              <p:par>
-                                <p:cTn id="25" presetID="1" presetClass="entr" presetSubtype="0" fill="hold" nodeType="withEffect">
-                                  <p:stCondLst>
-                                    <p:cond delay="0"/>
-                                  </p:stCondLst>
-                                  <p:childTnLst>
-                                    <p:set>
-                                      <p:cBhvr>
-                                        <p:cTn id="26" dur="1" fill="hold">
-                                          <p:stCondLst>
-                                            <p:cond delay="0"/>
-                                          </p:stCondLst>
-                                        </p:cTn>
-                                        <p:tgtEl>
-                                          <p:spTgt spid="8">
-                                            <p:txEl>
-                                              <p:pRg st="9" end="9"/>
-                                            </p:txEl>
-                                          </p:spTgt>
-                                        </p:tgtEl>
-                                        <p:attrNameLst>
-                                          <p:attrName>style.visibility</p:attrName>
-                                        </p:attrNameLst>
-                                      </p:cBhvr>
-                                      <p:to>
-                                        <p:strVal val="visible"/>
-                                      </p:to>
-                                    </p:set>
-                                  </p:childTnLst>
-                                </p:cTn>
-                              </p:par>
-                              <p:par>
-                                <p:cTn id="27" presetID="1" presetClass="entr" presetSubtype="0" fill="hold" nodeType="withEffect">
-                                  <p:stCondLst>
-                                    <p:cond delay="0"/>
-                                  </p:stCondLst>
-                                  <p:childTnLst>
-                                    <p:set>
-                                      <p:cBhvr>
-                                        <p:cTn id="28" dur="1" fill="hold">
-                                          <p:stCondLst>
-                                            <p:cond delay="0"/>
-                                          </p:stCondLst>
-                                        </p:cTn>
-                                        <p:tgtEl>
-                                          <p:spTgt spid="8">
-                                            <p:txEl>
-                                              <p:pRg st="10" end="10"/>
-                                            </p:txEl>
-                                          </p:spTgt>
-                                        </p:tgtEl>
-                                        <p:attrNameLst>
-                                          <p:attrName>style.visibility</p:attrName>
-                                        </p:attrNameLst>
-                                      </p:cBhvr>
-                                      <p:to>
-                                        <p:strVal val="visible"/>
-                                      </p:to>
-                                    </p:set>
-                                  </p:childTnLst>
-                                </p:cTn>
-                              </p:par>
-                              <p:par>
-                                <p:cTn id="29" presetID="1" presetClass="entr" presetSubtype="0" fill="hold" nodeType="withEffect">
-                                  <p:stCondLst>
-                                    <p:cond delay="0"/>
-                                  </p:stCondLst>
-                                  <p:childTnLst>
-                                    <p:set>
-                                      <p:cBhvr>
-                                        <p:cTn id="30" dur="1" fill="hold">
-                                          <p:stCondLst>
-                                            <p:cond delay="0"/>
-                                          </p:stCondLst>
-                                        </p:cTn>
-                                        <p:tgtEl>
-                                          <p:spTgt spid="8">
-                                            <p:txEl>
-                                              <p:pRg st="11" end="11"/>
                                             </p:txEl>
                                           </p:spTgt>
                                         </p:tgtEl>
@@ -18716,7 +18452,7 @@
             <a:fld id="{1778E95C-90A9-47F3-94FC-26BB930BF367}" type="datetime4">
               <a:rPr lang="en-US" noProof="0" smtClean="0"/>
               <a:pPr/>
-              <a:t>December 4, 2019</a:t>
+              <a:t>January 28, 2020</a:t>
             </a:fld>
             <a:endParaRPr lang="en-US" noProof="0" dirty="0"/>
           </a:p>
@@ -19591,7 +19327,7 @@
             <a:fld id="{9033B76D-9EB0-4BAD-8B86-32B8483D105A}" type="datetime4">
               <a:rPr lang="en-US" noProof="0" smtClean="0"/>
               <a:pPr/>
-              <a:t>December 4, 2019</a:t>
+              <a:t>January 28, 2020</a:t>
             </a:fld>
             <a:endParaRPr lang="en-US" noProof="0"/>
           </a:p>
@@ -21434,7 +21170,7 @@
             <a:fld id="{16319B54-2BFB-42AC-8934-6FE8400019D1}" type="datetime4">
               <a:rPr lang="en-US" noProof="0" smtClean="0"/>
               <a:pPr/>
-              <a:t>December 4, 2019</a:t>
+              <a:t>January 28, 2020</a:t>
             </a:fld>
             <a:endParaRPr lang="en-US" noProof="0"/>
           </a:p>
@@ -22472,27 +22208,6 @@
 </file>
 
 <file path=customXml/item1.xml><?xml version="1.0" encoding="utf-8"?>
-<?mso-contentType ?>
-<FormTemplates xmlns="http://schemas.microsoft.com/sharepoint/v3/contenttype/forms">
-  <Display>DocumentLibraryForm</Display>
-  <Edit>DocumentLibraryForm</Edit>
-  <New>DocumentLibraryForm</New>
-</FormTemplates>
-</file>
-
-<file path=customXml/item2.xml><?xml version="1.0" encoding="utf-8"?>
-<p:properties xmlns:p="http://schemas.microsoft.com/office/2006/metadata/properties" xmlns:xsi="http://www.w3.org/2001/XMLSchema-instance">
-  <documentManagement>
-    <Language xmlns="http://schemas.microsoft.com/sharepoint/v3">English (en)</Language>
-    <Owner xmlns="http://schemas.microsoft.com/sharepoint/v3">Schilasky</Owner>
-    <_Status xmlns="http://schemas.microsoft.com/sharepoint/v3/fields">Draft</_Status>
-    <SCCoverageSpatialOrgUnit xmlns="http://schemas.microsoft.com/sharepoint/v3">Continental AG</SCCoverageSpatialOrgUnit>
-    <ContinentalSecurityClass xmlns="http://schemas.microsoft.com/sharepoint/v3/fields">For internal use only</ContinentalSecurityClass>
-  </documentManagement>
-</p:properties>
-</file>
-
-<file path=customXml/item3.xml><?xml version="1.0" encoding="utf-8"?>
 <ct:contentTypeSchema xmlns:ct="http://schemas.microsoft.com/office/2006/metadata/contentType" xmlns:ma="http://schemas.microsoft.com/office/2006/metadata/properties/metaAttributes" ct:_="" ma:_="" ma:contentTypeName="Document (CCT)" ma:contentTypeID="0x01010060D3A2B5B42A0B4796CE5EB3AD8B0F9700F6EA441231AEA447A0EA374EF1BA3AC9" ma:contentTypeVersion="1" ma:contentTypeDescription="Core content type for documents (CCT)" ma:contentTypeScope="" ma:versionID="b41894697092ef65df9fccd8c33c01ee">
   <xsd:schema xmlns:xsd="http://www.w3.org/2001/XMLSchema" xmlns:p="http://schemas.microsoft.com/office/2006/metadata/properties" xmlns:ns1="http://schemas.microsoft.com/sharepoint/v3" xmlns:ns2="http://schemas.microsoft.com/sharepoint/v3/fields" targetNamespace="http://schemas.microsoft.com/office/2006/metadata/properties" ma:root="true" ma:fieldsID="185ee762ca8a4ed30c3923a76ca715e1" ns1:_="" ns2:_="">
     <xsd:import namespace="http://schemas.microsoft.com/sharepoint/v3"/>
@@ -22642,10 +22357,41 @@
 </ct:contentTypeSchema>
 </file>
 
+<file path=customXml/item2.xml><?xml version="1.0" encoding="utf-8"?>
+<p:properties xmlns:p="http://schemas.microsoft.com/office/2006/metadata/properties" xmlns:xsi="http://www.w3.org/2001/XMLSchema-instance">
+  <documentManagement>
+    <Language xmlns="http://schemas.microsoft.com/sharepoint/v3">English (en)</Language>
+    <Owner xmlns="http://schemas.microsoft.com/sharepoint/v3">Schilasky</Owner>
+    <_Status xmlns="http://schemas.microsoft.com/sharepoint/v3/fields">Draft</_Status>
+    <SCCoverageSpatialOrgUnit xmlns="http://schemas.microsoft.com/sharepoint/v3">Continental AG</SCCoverageSpatialOrgUnit>
+    <ContinentalSecurityClass xmlns="http://schemas.microsoft.com/sharepoint/v3/fields">For internal use only</ContinentalSecurityClass>
+  </documentManagement>
+</p:properties>
+</file>
+
+<file path=customXml/item3.xml><?xml version="1.0" encoding="utf-8"?>
+<?mso-contentType ?>
+<FormTemplates xmlns="http://schemas.microsoft.com/sharepoint/v3/contenttype/forms">
+  <Display>DocumentLibraryForm</Display>
+  <Edit>DocumentLibraryForm</Edit>
+  <New>DocumentLibraryForm</New>
+</FormTemplates>
+</file>
+
 <file path=customXml/itemProps1.xml><?xml version="1.0" encoding="utf-8"?>
-<ds:datastoreItem xmlns:ds="http://schemas.openxmlformats.org/officeDocument/2006/customXml" ds:itemID="{3FA6BFF3-45C2-4C38-9AAD-E3B7AC9EA1A1}">
+<ds:datastoreItem xmlns:ds="http://schemas.openxmlformats.org/officeDocument/2006/customXml" ds:itemID="{DF44401B-1D5E-4307-A806-10E826502A74}">
   <ds:schemaRefs>
-    <ds:schemaRef ds:uri="http://schemas.microsoft.com/sharepoint/v3/contenttype/forms"/>
+    <ds:schemaRef ds:uri="http://schemas.microsoft.com/office/2006/metadata/contentType"/>
+    <ds:schemaRef ds:uri="http://schemas.microsoft.com/office/2006/metadata/properties/metaAttributes"/>
+    <ds:schemaRef ds:uri="http://www.w3.org/2001/XMLSchema"/>
+    <ds:schemaRef ds:uri="http://schemas.microsoft.com/office/2006/metadata/properties"/>
+    <ds:schemaRef ds:uri="http://schemas.microsoft.com/sharepoint/v3"/>
+    <ds:schemaRef ds:uri="http://schemas.microsoft.com/sharepoint/v3/fields"/>
+    <ds:schemaRef ds:uri="http://schemas.microsoft.com/office/2006/documentManagement/types"/>
+    <ds:schemaRef ds:uri="http://schemas.openxmlformats.org/package/2006/metadata/core-properties"/>
+    <ds:schemaRef ds:uri="http://purl.org/dc/elements/1.1/"/>
+    <ds:schemaRef ds:uri="http://purl.org/dc/terms/"/>
+    <ds:schemaRef ds:uri="http://schemas.microsoft.com/office/internal/2005/internalDocumentation"/>
   </ds:schemaRefs>
 </ds:datastoreItem>
 </file>
@@ -22667,19 +22413,9 @@
 </file>
 
 <file path=customXml/itemProps3.xml><?xml version="1.0" encoding="utf-8"?>
-<ds:datastoreItem xmlns:ds="http://schemas.openxmlformats.org/officeDocument/2006/customXml" ds:itemID="{DF44401B-1D5E-4307-A806-10E826502A74}">
+<ds:datastoreItem xmlns:ds="http://schemas.openxmlformats.org/officeDocument/2006/customXml" ds:itemID="{3FA6BFF3-45C2-4C38-9AAD-E3B7AC9EA1A1}">
   <ds:schemaRefs>
-    <ds:schemaRef ds:uri="http://schemas.microsoft.com/office/2006/metadata/contentType"/>
-    <ds:schemaRef ds:uri="http://schemas.microsoft.com/office/2006/metadata/properties/metaAttributes"/>
-    <ds:schemaRef ds:uri="http://www.w3.org/2001/XMLSchema"/>
-    <ds:schemaRef ds:uri="http://schemas.microsoft.com/office/2006/metadata/properties"/>
-    <ds:schemaRef ds:uri="http://schemas.microsoft.com/sharepoint/v3"/>
-    <ds:schemaRef ds:uri="http://schemas.microsoft.com/sharepoint/v3/fields"/>
-    <ds:schemaRef ds:uri="http://schemas.microsoft.com/office/2006/documentManagement/types"/>
-    <ds:schemaRef ds:uri="http://schemas.openxmlformats.org/package/2006/metadata/core-properties"/>
-    <ds:schemaRef ds:uri="http://purl.org/dc/elements/1.1/"/>
-    <ds:schemaRef ds:uri="http://purl.org/dc/terms/"/>
-    <ds:schemaRef ds:uri="http://schemas.microsoft.com/office/internal/2005/internalDocumentation"/>
+    <ds:schemaRef ds:uri="http://schemas.microsoft.com/sharepoint/v3/contenttype/forms"/>
   </ds:schemaRefs>
 </ds:datastoreItem>
 </file>
</xml_diff>